<commit_message>
updating lesson 22 slides.
</commit_message>
<xml_diff>
--- a/notes/L22/Lsn22.pptx
+++ b/notes/L22/Lsn22.pptx
@@ -4715,7 +4715,7 @@
             <a:pPr lvl="1" algn="l"/>
             <a:r>
               <a:rPr lang="en-US" sz="1400" dirty="0">
-                <a:hlinkClick r:id="rId2" action="ppaction://hlinkfile"/>
+                <a:hlinkClick r:id="rId2"/>
               </a:rPr>
               <a:t>Mapping C Programming Constructs to MSP430 Assembly</a:t>
             </a:r>
@@ -4829,23 +4829,7 @@
                   <a:srgbClr val="0070C0"/>
                 </a:solidFill>
               </a:rPr>
-              <a:t>Assignment </a:t>
-            </a:r>
-            <a:r>
-              <a:rPr lang="en-US" sz="2000" dirty="0" smtClean="0">
-                <a:solidFill>
-                  <a:srgbClr val="0070C0"/>
-                </a:solidFill>
-              </a:rPr>
-              <a:t>8 </a:t>
-            </a:r>
-            <a:r>
-              <a:rPr lang="en-US" sz="2000" dirty="0" smtClean="0">
-                <a:solidFill>
-                  <a:srgbClr val="0070C0"/>
-                </a:solidFill>
-              </a:rPr>
-              <a:t>due BOC next today</a:t>
+              <a:t>Assignment 8 due BOC today</a:t>
             </a:r>
           </a:p>
           <a:p>
@@ -13378,17 +13362,7 @@
                 <a:latin typeface="Courier New" pitchFamily="49" charset="0"/>
                 <a:cs typeface="Courier New" pitchFamily="49" charset="0"/>
               </a:rPr>
-              <a:t>Etch-a-sketch/paint </a:t>
-            </a:r>
-            <a:r>
-              <a:rPr lang="en-US" sz="1400" b="1" dirty="0" smtClean="0">
-                <a:solidFill>
-                  <a:schemeClr val="accent2"/>
-                </a:solidFill>
-                <a:latin typeface="Courier New" pitchFamily="49" charset="0"/>
-                <a:cs typeface="Courier New" pitchFamily="49" charset="0"/>
-              </a:rPr>
-              <a:t>program on the LCD display</a:t>
+              <a:t>Etch-a-sketch/paint program on the LCD display</a:t>
             </a:r>
           </a:p>
           <a:p>

</xml_diff>